<commit_message>
Criação Arquivo De Rotas Principal e Declaracao dos components home footer menu contato e sobre
</commit_message>
<xml_diff>
--- a/Mapas.pptx
+++ b/Mapas.pptx
@@ -10,6 +10,10 @@
     <p:sldId id="258" r:id="rId4"/>
     <p:sldId id="259" r:id="rId5"/>
     <p:sldId id="260" r:id="rId6"/>
+    <p:sldId id="261" r:id="rId7"/>
+    <p:sldId id="262" r:id="rId8"/>
+    <p:sldId id="263" r:id="rId9"/>
+    <p:sldId id="264" r:id="rId10"/>
   </p:sldIdLst>
   <p:sldSz cx="12192000" cy="6858000"/>
   <p:notesSz cx="6858000" cy="9144000"/>
@@ -247,7 +251,7 @@
           <a:p>
             <a:fld id="{6CC97BCC-8571-45FC-B7FA-65F35AFF22BA}" type="datetimeFigureOut">
               <a:rPr lang="pt-BR" smtClean="0"/>
-              <a:t>01/10/2022</a:t>
+              <a:t>03/10/2022</a:t>
             </a:fld>
             <a:endParaRPr lang="pt-BR"/>
           </a:p>
@@ -417,7 +421,7 @@
           <a:p>
             <a:fld id="{6CC97BCC-8571-45FC-B7FA-65F35AFF22BA}" type="datetimeFigureOut">
               <a:rPr lang="pt-BR" smtClean="0"/>
-              <a:t>01/10/2022</a:t>
+              <a:t>03/10/2022</a:t>
             </a:fld>
             <a:endParaRPr lang="pt-BR"/>
           </a:p>
@@ -597,7 +601,7 @@
           <a:p>
             <a:fld id="{6CC97BCC-8571-45FC-B7FA-65F35AFF22BA}" type="datetimeFigureOut">
               <a:rPr lang="pt-BR" smtClean="0"/>
-              <a:t>01/10/2022</a:t>
+              <a:t>03/10/2022</a:t>
             </a:fld>
             <a:endParaRPr lang="pt-BR"/>
           </a:p>
@@ -767,7 +771,7 @@
           <a:p>
             <a:fld id="{6CC97BCC-8571-45FC-B7FA-65F35AFF22BA}" type="datetimeFigureOut">
               <a:rPr lang="pt-BR" smtClean="0"/>
-              <a:t>01/10/2022</a:t>
+              <a:t>03/10/2022</a:t>
             </a:fld>
             <a:endParaRPr lang="pt-BR"/>
           </a:p>
@@ -1013,7 +1017,7 @@
           <a:p>
             <a:fld id="{6CC97BCC-8571-45FC-B7FA-65F35AFF22BA}" type="datetimeFigureOut">
               <a:rPr lang="pt-BR" smtClean="0"/>
-              <a:t>01/10/2022</a:t>
+              <a:t>03/10/2022</a:t>
             </a:fld>
             <a:endParaRPr lang="pt-BR"/>
           </a:p>
@@ -1245,7 +1249,7 @@
           <a:p>
             <a:fld id="{6CC97BCC-8571-45FC-B7FA-65F35AFF22BA}" type="datetimeFigureOut">
               <a:rPr lang="pt-BR" smtClean="0"/>
-              <a:t>01/10/2022</a:t>
+              <a:t>03/10/2022</a:t>
             </a:fld>
             <a:endParaRPr lang="pt-BR"/>
           </a:p>
@@ -1612,7 +1616,7 @@
           <a:p>
             <a:fld id="{6CC97BCC-8571-45FC-B7FA-65F35AFF22BA}" type="datetimeFigureOut">
               <a:rPr lang="pt-BR" smtClean="0"/>
-              <a:t>01/10/2022</a:t>
+              <a:t>03/10/2022</a:t>
             </a:fld>
             <a:endParaRPr lang="pt-BR"/>
           </a:p>
@@ -1730,7 +1734,7 @@
           <a:p>
             <a:fld id="{6CC97BCC-8571-45FC-B7FA-65F35AFF22BA}" type="datetimeFigureOut">
               <a:rPr lang="pt-BR" smtClean="0"/>
-              <a:t>01/10/2022</a:t>
+              <a:t>03/10/2022</a:t>
             </a:fld>
             <a:endParaRPr lang="pt-BR"/>
           </a:p>
@@ -1825,7 +1829,7 @@
           <a:p>
             <a:fld id="{6CC97BCC-8571-45FC-B7FA-65F35AFF22BA}" type="datetimeFigureOut">
               <a:rPr lang="pt-BR" smtClean="0"/>
-              <a:t>01/10/2022</a:t>
+              <a:t>03/10/2022</a:t>
             </a:fld>
             <a:endParaRPr lang="pt-BR"/>
           </a:p>
@@ -2102,7 +2106,7 @@
           <a:p>
             <a:fld id="{6CC97BCC-8571-45FC-B7FA-65F35AFF22BA}" type="datetimeFigureOut">
               <a:rPr lang="pt-BR" smtClean="0"/>
-              <a:t>01/10/2022</a:t>
+              <a:t>03/10/2022</a:t>
             </a:fld>
             <a:endParaRPr lang="pt-BR"/>
           </a:p>
@@ -2355,7 +2359,7 @@
           <a:p>
             <a:fld id="{6CC97BCC-8571-45FC-B7FA-65F35AFF22BA}" type="datetimeFigureOut">
               <a:rPr lang="pt-BR" smtClean="0"/>
-              <a:t>01/10/2022</a:t>
+              <a:t>03/10/2022</a:t>
             </a:fld>
             <a:endParaRPr lang="pt-BR"/>
           </a:p>
@@ -2568,7 +2572,7 @@
           <a:p>
             <a:fld id="{6CC97BCC-8571-45FC-B7FA-65F35AFF22BA}" type="datetimeFigureOut">
               <a:rPr lang="pt-BR" smtClean="0"/>
-              <a:t>01/10/2022</a:t>
+              <a:t>03/10/2022</a:t>
             </a:fld>
             <a:endParaRPr lang="pt-BR"/>
           </a:p>
@@ -4990,6 +4994,1150 @@
 </p:sld>
 </file>
 
+<file path=ppt/slides/slide6.xml><?xml version="1.0" encoding="utf-8"?>
+<p:sld xmlns:a="http://schemas.openxmlformats.org/drawingml/2006/main" xmlns:r="http://schemas.openxmlformats.org/officeDocument/2006/relationships" xmlns:p="http://schemas.openxmlformats.org/presentationml/2006/main">
+  <p:cSld>
+    <p:spTree>
+      <p:nvGrpSpPr>
+        <p:cNvPr id="1" name=""/>
+        <p:cNvGrpSpPr/>
+        <p:nvPr/>
+      </p:nvGrpSpPr>
+      <p:grpSpPr>
+        <a:xfrm>
+          <a:off x="0" y="0"/>
+          <a:ext cx="0" cy="0"/>
+          <a:chOff x="0" y="0"/>
+          <a:chExt cx="0" cy="0"/>
+        </a:xfrm>
+      </p:grpSpPr>
+      <p:sp>
+        <p:nvSpPr>
+          <p:cNvPr id="2" name="Título 1"/>
+          <p:cNvSpPr>
+            <a:spLocks noGrp="1"/>
+          </p:cNvSpPr>
+          <p:nvPr>
+            <p:ph type="title"/>
+          </p:nvPr>
+        </p:nvSpPr>
+        <p:spPr/>
+        <p:txBody>
+          <a:bodyPr/>
+          <a:lstStyle/>
+          <a:p>
+            <a:r>
+              <a:rPr lang="pt-BR" dirty="0" err="1" smtClean="0"/>
+              <a:t>Angular.json</a:t>
+            </a:r>
+            <a:r>
+              <a:rPr lang="pt-BR" dirty="0" smtClean="0"/>
+              <a:t> dica para manipular as criação de arquivos no comando </a:t>
+            </a:r>
+            <a:r>
+              <a:rPr lang="pt-BR" dirty="0" err="1" smtClean="0"/>
+              <a:t>ng</a:t>
+            </a:r>
+            <a:r>
+              <a:rPr lang="pt-BR" dirty="0" smtClean="0"/>
+              <a:t> g c </a:t>
+            </a:r>
+            <a:r>
+              <a:rPr lang="pt-BR" dirty="0" err="1" smtClean="0"/>
+              <a:t>component</a:t>
+            </a:r>
+            <a:endParaRPr lang="pt-BR" dirty="0"/>
+          </a:p>
+        </p:txBody>
+      </p:sp>
+      <p:pic>
+        <p:nvPicPr>
+          <p:cNvPr id="3" name="Imagem 2"/>
+          <p:cNvPicPr>
+            <a:picLocks noChangeAspect="1"/>
+          </p:cNvPicPr>
+          <p:nvPr/>
+        </p:nvPicPr>
+        <p:blipFill>
+          <a:blip r:embed="rId2"/>
+          <a:stretch>
+            <a:fillRect/>
+          </a:stretch>
+        </p:blipFill>
+        <p:spPr>
+          <a:xfrm>
+            <a:off x="4688312" y="2263731"/>
+            <a:ext cx="5391150" cy="3695700"/>
+          </a:xfrm>
+          <a:prstGeom prst="rect">
+            <a:avLst/>
+          </a:prstGeom>
+        </p:spPr>
+      </p:pic>
+      <p:sp>
+        <p:nvSpPr>
+          <p:cNvPr id="4" name="CaixaDeTexto 3"/>
+          <p:cNvSpPr txBox="1"/>
+          <p:nvPr/>
+        </p:nvSpPr>
+        <p:spPr>
+          <a:xfrm>
+            <a:off x="618186" y="2112135"/>
+            <a:ext cx="3567643" cy="3139321"/>
+          </a:xfrm>
+          <a:prstGeom prst="rect">
+            <a:avLst/>
+          </a:prstGeom>
+          <a:noFill/>
+        </p:spPr>
+        <p:txBody>
+          <a:bodyPr wrap="none" rtlCol="0">
+            <a:spAutoFit/>
+          </a:bodyPr>
+          <a:lstStyle/>
+          <a:p>
+            <a:r>
+              <a:rPr lang="pt-BR" dirty="0" smtClean="0"/>
+              <a:t>Manipular as variáveis do</a:t>
+            </a:r>
+          </a:p>
+          <a:p>
+            <a:r>
+              <a:rPr lang="pt-BR" dirty="0" err="1" smtClean="0"/>
+              <a:t>Schematics</a:t>
+            </a:r>
+            <a:r>
+              <a:rPr lang="pt-BR" dirty="0" smtClean="0"/>
+              <a:t>/</a:t>
+            </a:r>
+            <a:r>
+              <a:rPr lang="pt-BR" dirty="0" err="1" smtClean="0"/>
+              <a:t>angular:componente</a:t>
+            </a:r>
+            <a:endParaRPr lang="pt-BR" dirty="0" smtClean="0"/>
+          </a:p>
+          <a:p>
+            <a:endParaRPr lang="pt-BR" dirty="0" smtClean="0"/>
+          </a:p>
+          <a:p>
+            <a:r>
+              <a:rPr lang="pt-BR" dirty="0" smtClean="0"/>
+              <a:t>Comandos útil para testar: </a:t>
+            </a:r>
+          </a:p>
+          <a:p>
+            <a:r>
+              <a:rPr lang="pt-BR" dirty="0" err="1" smtClean="0"/>
+              <a:t>ng</a:t>
+            </a:r>
+            <a:r>
+              <a:rPr lang="pt-BR" dirty="0" smtClean="0"/>
+              <a:t> g c componente –d (</a:t>
+            </a:r>
+            <a:r>
+              <a:rPr lang="pt-BR" dirty="0" err="1" smtClean="0"/>
+              <a:t>dry</a:t>
+            </a:r>
+            <a:r>
+              <a:rPr lang="pt-BR" dirty="0" smtClean="0"/>
+              <a:t> teste)</a:t>
+            </a:r>
+          </a:p>
+          <a:p>
+            <a:endParaRPr lang="pt-BR" dirty="0"/>
+          </a:p>
+          <a:p>
+            <a:r>
+              <a:rPr lang="pt-BR" dirty="0" smtClean="0"/>
+              <a:t>Nesse projeto a criação foi </a:t>
+            </a:r>
+            <a:r>
+              <a:rPr lang="pt-BR" dirty="0" err="1" smtClean="0"/>
+              <a:t>minimal</a:t>
+            </a:r>
+            <a:endParaRPr lang="pt-BR" dirty="0" smtClean="0"/>
+          </a:p>
+          <a:p>
+            <a:r>
+              <a:rPr lang="pt-BR" dirty="0" smtClean="0"/>
+              <a:t>Para reduzir o </a:t>
+            </a:r>
+            <a:r>
+              <a:rPr lang="pt-BR" dirty="0" err="1" smtClean="0"/>
+              <a:t>scopo</a:t>
+            </a:r>
+            <a:r>
+              <a:rPr lang="pt-BR" dirty="0" smtClean="0"/>
+              <a:t> do projeto e –g</a:t>
+            </a:r>
+            <a:br>
+              <a:rPr lang="pt-BR" dirty="0" smtClean="0"/>
+            </a:br>
+            <a:r>
+              <a:rPr lang="pt-BR" dirty="0" smtClean="0"/>
+              <a:t>para não criar os arquivos do </a:t>
+            </a:r>
+            <a:r>
+              <a:rPr lang="pt-BR" dirty="0" err="1" smtClean="0"/>
+              <a:t>git</a:t>
+            </a:r>
+            <a:endParaRPr lang="pt-BR" dirty="0" smtClean="0"/>
+          </a:p>
+          <a:p>
+            <a:r>
+              <a:rPr lang="pt-BR" dirty="0" smtClean="0"/>
+              <a:t>Comando: </a:t>
+            </a:r>
+          </a:p>
+          <a:p>
+            <a:r>
+              <a:rPr lang="pt-BR" dirty="0" err="1" smtClean="0"/>
+              <a:t>ng</a:t>
+            </a:r>
+            <a:r>
+              <a:rPr lang="pt-BR" dirty="0" smtClean="0"/>
+              <a:t> new </a:t>
+            </a:r>
+            <a:r>
+              <a:rPr lang="pt-BR" dirty="0" err="1" smtClean="0"/>
+              <a:t>MeuProjeto</a:t>
+            </a:r>
+            <a:r>
+              <a:rPr lang="pt-BR" dirty="0" smtClean="0"/>
+              <a:t> –</a:t>
+            </a:r>
+            <a:r>
+              <a:rPr lang="pt-BR" dirty="0" err="1" smtClean="0"/>
+              <a:t>minimal</a:t>
+            </a:r>
+            <a:r>
+              <a:rPr lang="pt-BR" dirty="0" smtClean="0"/>
+              <a:t> –g </a:t>
+            </a:r>
+            <a:endParaRPr lang="pt-BR" dirty="0"/>
+          </a:p>
+        </p:txBody>
+      </p:sp>
+    </p:spTree>
+    <p:extLst>
+      <p:ext uri="{BB962C8B-B14F-4D97-AF65-F5344CB8AC3E}">
+        <p14:creationId xmlns:p14="http://schemas.microsoft.com/office/powerpoint/2010/main" val="798143306"/>
+      </p:ext>
+    </p:extLst>
+  </p:cSld>
+  <p:clrMapOvr>
+    <a:masterClrMapping/>
+  </p:clrMapOvr>
+</p:sld>
+</file>
+
+<file path=ppt/slides/slide7.xml><?xml version="1.0" encoding="utf-8"?>
+<p:sld xmlns:a="http://schemas.openxmlformats.org/drawingml/2006/main" xmlns:r="http://schemas.openxmlformats.org/officeDocument/2006/relationships" xmlns:p="http://schemas.openxmlformats.org/presentationml/2006/main">
+  <p:cSld>
+    <p:spTree>
+      <p:nvGrpSpPr>
+        <p:cNvPr id="1" name=""/>
+        <p:cNvGrpSpPr/>
+        <p:nvPr/>
+      </p:nvGrpSpPr>
+      <p:grpSpPr>
+        <a:xfrm>
+          <a:off x="0" y="0"/>
+          <a:ext cx="0" cy="0"/>
+          <a:chOff x="0" y="0"/>
+          <a:chExt cx="0" cy="0"/>
+        </a:xfrm>
+      </p:grpSpPr>
+      <p:sp>
+        <p:nvSpPr>
+          <p:cNvPr id="2" name="Título 1"/>
+          <p:cNvSpPr>
+            <a:spLocks noGrp="1"/>
+          </p:cNvSpPr>
+          <p:nvPr>
+            <p:ph type="title"/>
+          </p:nvPr>
+        </p:nvSpPr>
+        <p:spPr>
+          <a:xfrm>
+            <a:off x="323045" y="0"/>
+            <a:ext cx="10515600" cy="1325563"/>
+          </a:xfrm>
+        </p:spPr>
+        <p:txBody>
+          <a:bodyPr/>
+          <a:lstStyle/>
+          <a:p>
+            <a:r>
+              <a:rPr lang="pt-BR" dirty="0" smtClean="0"/>
+              <a:t>Resumo sobre rotas</a:t>
+            </a:r>
+            <a:endParaRPr lang="pt-BR" dirty="0"/>
+          </a:p>
+        </p:txBody>
+      </p:sp>
+      <p:sp>
+        <p:nvSpPr>
+          <p:cNvPr id="3" name="Retângulo 2"/>
+          <p:cNvSpPr/>
+          <p:nvPr/>
+        </p:nvSpPr>
+        <p:spPr>
+          <a:xfrm>
+            <a:off x="920303" y="1468193"/>
+            <a:ext cx="2698660" cy="965914"/>
+          </a:xfrm>
+          <a:prstGeom prst="rect">
+            <a:avLst/>
+          </a:prstGeom>
+          <a:noFill/>
+        </p:spPr>
+        <p:style>
+          <a:lnRef idx="2">
+            <a:schemeClr val="accent1">
+              <a:shade val="50000"/>
+            </a:schemeClr>
+          </a:lnRef>
+          <a:fillRef idx="1">
+            <a:schemeClr val="accent1"/>
+          </a:fillRef>
+          <a:effectRef idx="0">
+            <a:schemeClr val="accent1"/>
+          </a:effectRef>
+          <a:fontRef idx="minor">
+            <a:schemeClr val="lt1"/>
+          </a:fontRef>
+        </p:style>
+        <p:txBody>
+          <a:bodyPr rtlCol="0" anchor="ctr"/>
+          <a:lstStyle/>
+          <a:p>
+            <a:pPr algn="ctr"/>
+            <a:r>
+              <a:rPr lang="pt-BR" sz="1100" dirty="0" smtClean="0">
+                <a:solidFill>
+                  <a:schemeClr val="tx1"/>
+                </a:solidFill>
+              </a:rPr>
+              <a:t>Arquivo com uma constante de rotas não tem </a:t>
+            </a:r>
+            <a:r>
+              <a:rPr lang="pt-BR" sz="1100" dirty="0" err="1" smtClean="0">
+                <a:solidFill>
+                  <a:schemeClr val="tx1"/>
+                </a:solidFill>
+              </a:rPr>
+              <a:t>decorator</a:t>
+            </a:r>
+            <a:r>
+              <a:rPr lang="pt-BR" sz="1100" dirty="0" smtClean="0">
+                <a:solidFill>
+                  <a:schemeClr val="tx1"/>
+                </a:solidFill>
+              </a:rPr>
+              <a:t> apenas </a:t>
+            </a:r>
+            <a:r>
+              <a:rPr lang="pt-BR" sz="1100" dirty="0" err="1" smtClean="0">
+                <a:solidFill>
+                  <a:schemeClr val="tx1"/>
+                </a:solidFill>
+              </a:rPr>
+              <a:t>tipado</a:t>
+            </a:r>
+            <a:r>
+              <a:rPr lang="pt-BR" sz="1100" dirty="0" smtClean="0">
+                <a:solidFill>
+                  <a:schemeClr val="tx1"/>
+                </a:solidFill>
+              </a:rPr>
+              <a:t> como </a:t>
+            </a:r>
+            <a:r>
+              <a:rPr lang="pt-BR" sz="1100" dirty="0" err="1" smtClean="0">
+                <a:solidFill>
+                  <a:schemeClr val="tx1"/>
+                </a:solidFill>
+              </a:rPr>
+              <a:t>Router</a:t>
+            </a:r>
+            <a:endParaRPr lang="pt-BR" sz="1100" dirty="0" smtClean="0">
+              <a:solidFill>
+                <a:schemeClr val="tx1"/>
+              </a:solidFill>
+            </a:endParaRPr>
+          </a:p>
+          <a:p>
+            <a:pPr algn="ctr"/>
+            <a:endParaRPr lang="pt-BR" dirty="0">
+              <a:solidFill>
+                <a:schemeClr val="tx1"/>
+              </a:solidFill>
+            </a:endParaRPr>
+          </a:p>
+        </p:txBody>
+      </p:sp>
+      <p:sp>
+        <p:nvSpPr>
+          <p:cNvPr id="4" name="Retângulo 3"/>
+          <p:cNvSpPr/>
+          <p:nvPr/>
+        </p:nvSpPr>
+        <p:spPr>
+          <a:xfrm>
+            <a:off x="5999408" y="1468193"/>
+            <a:ext cx="4058992" cy="965914"/>
+          </a:xfrm>
+          <a:prstGeom prst="rect">
+            <a:avLst/>
+          </a:prstGeom>
+          <a:noFill/>
+        </p:spPr>
+        <p:style>
+          <a:lnRef idx="2">
+            <a:schemeClr val="accent1">
+              <a:shade val="50000"/>
+            </a:schemeClr>
+          </a:lnRef>
+          <a:fillRef idx="1">
+            <a:schemeClr val="accent1"/>
+          </a:fillRef>
+          <a:effectRef idx="0">
+            <a:schemeClr val="accent1"/>
+          </a:effectRef>
+          <a:fontRef idx="minor">
+            <a:schemeClr val="lt1"/>
+          </a:fontRef>
+        </p:style>
+        <p:txBody>
+          <a:bodyPr rtlCol="0" anchor="ctr"/>
+          <a:lstStyle/>
+          <a:p>
+            <a:pPr algn="ctr"/>
+            <a:r>
+              <a:rPr lang="pt-BR" sz="1100" dirty="0" smtClean="0">
+                <a:solidFill>
+                  <a:schemeClr val="tx1"/>
+                </a:solidFill>
+              </a:rPr>
+              <a:t>Dentro de </a:t>
+            </a:r>
+            <a:r>
+              <a:rPr lang="pt-BR" sz="1100" dirty="0" err="1" smtClean="0">
+                <a:solidFill>
+                  <a:schemeClr val="tx1"/>
+                </a:solidFill>
+              </a:rPr>
+              <a:t>AppModel</a:t>
+            </a:r>
+            <a:r>
+              <a:rPr lang="pt-BR" sz="1100" dirty="0" smtClean="0">
+                <a:solidFill>
+                  <a:schemeClr val="tx1"/>
+                </a:solidFill>
+              </a:rPr>
+              <a:t> e necessário ter um arquivo de rota padrão.</a:t>
+            </a:r>
+            <a:br>
+              <a:rPr lang="pt-BR" sz="1100" dirty="0" smtClean="0">
+                <a:solidFill>
+                  <a:schemeClr val="tx1"/>
+                </a:solidFill>
+              </a:rPr>
+            </a:br>
+            <a:r>
+              <a:rPr lang="pt-BR" sz="1100" dirty="0" smtClean="0">
+                <a:solidFill>
+                  <a:schemeClr val="tx1"/>
+                </a:solidFill>
+              </a:rPr>
+              <a:t>Importar a biblioteca </a:t>
+            </a:r>
+            <a:r>
+              <a:rPr lang="pt-BR" sz="1100" dirty="0" err="1" smtClean="0">
+                <a:solidFill>
+                  <a:schemeClr val="tx1"/>
+                </a:solidFill>
+              </a:rPr>
+              <a:t>RouterModule</a:t>
+            </a:r>
+            <a:r>
+              <a:rPr lang="pt-BR" sz="1100" dirty="0">
+                <a:solidFill>
+                  <a:schemeClr val="tx1"/>
+                </a:solidFill>
+              </a:rPr>
+              <a:t> </a:t>
+            </a:r>
+            <a:r>
+              <a:rPr lang="pt-BR" sz="1100" dirty="0" smtClean="0">
+                <a:solidFill>
+                  <a:schemeClr val="tx1"/>
+                </a:solidFill>
+              </a:rPr>
+              <a:t>na função </a:t>
+            </a:r>
+            <a:r>
+              <a:rPr lang="pt-BR" sz="1100" dirty="0" err="1" smtClean="0">
+                <a:solidFill>
+                  <a:schemeClr val="tx1"/>
+                </a:solidFill>
+              </a:rPr>
+              <a:t>forRoot</a:t>
+            </a:r>
+            <a:r>
+              <a:rPr lang="pt-BR" sz="1100" dirty="0" smtClean="0">
+                <a:solidFill>
+                  <a:schemeClr val="tx1"/>
+                </a:solidFill>
+              </a:rPr>
+              <a:t>(arquivo de rota padrão, {</a:t>
+            </a:r>
+            <a:r>
+              <a:rPr lang="pt-BR" sz="1100" dirty="0" err="1" smtClean="0">
+                <a:solidFill>
+                  <a:schemeClr val="tx1"/>
+                </a:solidFill>
+              </a:rPr>
+              <a:t>userHash</a:t>
+            </a:r>
+            <a:r>
+              <a:rPr lang="pt-BR" sz="1100" dirty="0" smtClean="0">
+                <a:solidFill>
+                  <a:schemeClr val="tx1"/>
+                </a:solidFill>
+              </a:rPr>
+              <a:t>: false})</a:t>
+            </a:r>
+          </a:p>
+          <a:p>
+            <a:pPr algn="ctr"/>
+            <a:endParaRPr lang="pt-BR" dirty="0">
+              <a:solidFill>
+                <a:schemeClr val="tx1"/>
+              </a:solidFill>
+            </a:endParaRPr>
+          </a:p>
+        </p:txBody>
+      </p:sp>
+      <p:pic>
+        <p:nvPicPr>
+          <p:cNvPr id="5" name="Imagem 4"/>
+          <p:cNvPicPr>
+            <a:picLocks noChangeAspect="1"/>
+          </p:cNvPicPr>
+          <p:nvPr/>
+        </p:nvPicPr>
+        <p:blipFill>
+          <a:blip r:embed="rId2"/>
+          <a:stretch>
+            <a:fillRect/>
+          </a:stretch>
+        </p:blipFill>
+        <p:spPr>
+          <a:xfrm>
+            <a:off x="686403" y="2793756"/>
+            <a:ext cx="4993180" cy="3619923"/>
+          </a:xfrm>
+          <a:prstGeom prst="rect">
+            <a:avLst/>
+          </a:prstGeom>
+        </p:spPr>
+      </p:pic>
+      <p:pic>
+        <p:nvPicPr>
+          <p:cNvPr id="6" name="Imagem 5"/>
+          <p:cNvPicPr>
+            <a:picLocks noChangeAspect="1"/>
+          </p:cNvPicPr>
+          <p:nvPr/>
+        </p:nvPicPr>
+        <p:blipFill>
+          <a:blip r:embed="rId3"/>
+          <a:stretch>
+            <a:fillRect/>
+          </a:stretch>
+        </p:blipFill>
+        <p:spPr>
+          <a:xfrm>
+            <a:off x="5748270" y="2793756"/>
+            <a:ext cx="5919989" cy="1228725"/>
+          </a:xfrm>
+          <a:prstGeom prst="rect">
+            <a:avLst/>
+          </a:prstGeom>
+        </p:spPr>
+      </p:pic>
+    </p:spTree>
+    <p:extLst>
+      <p:ext uri="{BB962C8B-B14F-4D97-AF65-F5344CB8AC3E}">
+        <p14:creationId xmlns:p14="http://schemas.microsoft.com/office/powerpoint/2010/main" val="2731514503"/>
+      </p:ext>
+    </p:extLst>
+  </p:cSld>
+  <p:clrMapOvr>
+    <a:masterClrMapping/>
+  </p:clrMapOvr>
+</p:sld>
+</file>
+
+<file path=ppt/slides/slide8.xml><?xml version="1.0" encoding="utf-8"?>
+<p:sld xmlns:a="http://schemas.openxmlformats.org/drawingml/2006/main" xmlns:r="http://schemas.openxmlformats.org/officeDocument/2006/relationships" xmlns:p="http://schemas.openxmlformats.org/presentationml/2006/main">
+  <p:cSld>
+    <p:spTree>
+      <p:nvGrpSpPr>
+        <p:cNvPr id="1" name=""/>
+        <p:cNvGrpSpPr/>
+        <p:nvPr/>
+      </p:nvGrpSpPr>
+      <p:grpSpPr>
+        <a:xfrm>
+          <a:off x="0" y="0"/>
+          <a:ext cx="0" cy="0"/>
+          <a:chOff x="0" y="0"/>
+          <a:chExt cx="0" cy="0"/>
+        </a:xfrm>
+      </p:grpSpPr>
+      <p:sp>
+        <p:nvSpPr>
+          <p:cNvPr id="2" name="Título 1"/>
+          <p:cNvSpPr>
+            <a:spLocks noGrp="1"/>
+          </p:cNvSpPr>
+          <p:nvPr>
+            <p:ph type="title"/>
+          </p:nvPr>
+        </p:nvSpPr>
+        <p:spPr>
+          <a:xfrm>
+            <a:off x="0" y="23039"/>
+            <a:ext cx="10515600" cy="1325563"/>
+          </a:xfrm>
+        </p:spPr>
+        <p:txBody>
+          <a:bodyPr/>
+          <a:lstStyle/>
+          <a:p>
+            <a:r>
+              <a:rPr lang="pt-BR" dirty="0" smtClean="0"/>
+              <a:t>Rotas</a:t>
+            </a:r>
+            <a:endParaRPr lang="pt-BR" dirty="0"/>
+          </a:p>
+        </p:txBody>
+      </p:sp>
+      <p:pic>
+        <p:nvPicPr>
+          <p:cNvPr id="3" name="Imagem 2"/>
+          <p:cNvPicPr>
+            <a:picLocks noChangeAspect="1"/>
+          </p:cNvPicPr>
+          <p:nvPr/>
+        </p:nvPicPr>
+        <p:blipFill>
+          <a:blip r:embed="rId2"/>
+          <a:stretch>
+            <a:fillRect/>
+          </a:stretch>
+        </p:blipFill>
+        <p:spPr>
+          <a:xfrm>
+            <a:off x="3896999" y="3284113"/>
+            <a:ext cx="8048625" cy="3365475"/>
+          </a:xfrm>
+          <a:prstGeom prst="rect">
+            <a:avLst/>
+          </a:prstGeom>
+        </p:spPr>
+      </p:pic>
+      <p:pic>
+        <p:nvPicPr>
+          <p:cNvPr id="4" name="Imagem 3"/>
+          <p:cNvPicPr>
+            <a:picLocks noChangeAspect="1"/>
+          </p:cNvPicPr>
+          <p:nvPr/>
+        </p:nvPicPr>
+        <p:blipFill>
+          <a:blip r:embed="rId3"/>
+          <a:stretch>
+            <a:fillRect/>
+          </a:stretch>
+        </p:blipFill>
+        <p:spPr>
+          <a:xfrm>
+            <a:off x="0" y="1187068"/>
+            <a:ext cx="6638925" cy="1672041"/>
+          </a:xfrm>
+          <a:prstGeom prst="rect">
+            <a:avLst/>
+          </a:prstGeom>
+        </p:spPr>
+      </p:pic>
+      <p:sp>
+        <p:nvSpPr>
+          <p:cNvPr id="5" name="Retângulo 4"/>
+          <p:cNvSpPr/>
+          <p:nvPr/>
+        </p:nvSpPr>
+        <p:spPr>
+          <a:xfrm>
+            <a:off x="257577" y="3284113"/>
+            <a:ext cx="3155324" cy="3142445"/>
+          </a:xfrm>
+          <a:prstGeom prst="rect">
+            <a:avLst/>
+          </a:prstGeom>
+          <a:noFill/>
+        </p:spPr>
+        <p:style>
+          <a:lnRef idx="2">
+            <a:schemeClr val="accent1">
+              <a:shade val="50000"/>
+            </a:schemeClr>
+          </a:lnRef>
+          <a:fillRef idx="1">
+            <a:schemeClr val="accent1"/>
+          </a:fillRef>
+          <a:effectRef idx="0">
+            <a:schemeClr val="accent1"/>
+          </a:effectRef>
+          <a:fontRef idx="minor">
+            <a:schemeClr val="lt1"/>
+          </a:fontRef>
+        </p:style>
+        <p:txBody>
+          <a:bodyPr rtlCol="0" anchor="ctr"/>
+          <a:lstStyle/>
+          <a:p>
+            <a:pPr algn="ctr"/>
+            <a:r>
+              <a:rPr lang="pt-BR" dirty="0" smtClean="0">
+                <a:solidFill>
+                  <a:schemeClr val="tx1"/>
+                </a:solidFill>
+              </a:rPr>
+              <a:t>Em </a:t>
+            </a:r>
+            <a:r>
+              <a:rPr lang="pt-BR" dirty="0" err="1" smtClean="0">
+                <a:solidFill>
+                  <a:schemeClr val="tx1"/>
+                </a:solidFill>
+              </a:rPr>
+              <a:t>Providers</a:t>
+            </a:r>
+            <a:r>
+              <a:rPr lang="pt-BR" dirty="0" smtClean="0">
+                <a:solidFill>
+                  <a:schemeClr val="tx1"/>
+                </a:solidFill>
+              </a:rPr>
+              <a:t> e necessário declarar o serviço de </a:t>
+            </a:r>
+            <a:r>
+              <a:rPr lang="pt-BR" dirty="0" err="1" smtClean="0">
+                <a:solidFill>
+                  <a:schemeClr val="tx1"/>
+                </a:solidFill>
+              </a:rPr>
+              <a:t>base_href</a:t>
+            </a:r>
+            <a:r>
+              <a:rPr lang="pt-BR" dirty="0" smtClean="0">
+                <a:solidFill>
+                  <a:schemeClr val="tx1"/>
+                </a:solidFill>
+              </a:rPr>
+              <a:t> ou seja se eu inserir “</a:t>
+            </a:r>
+            <a:r>
+              <a:rPr lang="pt-BR" dirty="0" err="1" smtClean="0">
+                <a:solidFill>
+                  <a:schemeClr val="tx1"/>
+                </a:solidFill>
+              </a:rPr>
+              <a:t>antonio</a:t>
+            </a:r>
+            <a:r>
+              <a:rPr lang="pt-BR" dirty="0" smtClean="0">
+                <a:solidFill>
+                  <a:schemeClr val="tx1"/>
+                </a:solidFill>
+              </a:rPr>
+              <a:t>” no lugar da ‘/’</a:t>
+            </a:r>
+          </a:p>
+          <a:p>
+            <a:pPr algn="ctr"/>
+            <a:r>
+              <a:rPr lang="pt-BR" dirty="0" smtClean="0">
+                <a:solidFill>
+                  <a:schemeClr val="tx1"/>
+                </a:solidFill>
+              </a:rPr>
+              <a:t>E assim que vai ser o default: ao carregar a </a:t>
+            </a:r>
+            <a:r>
+              <a:rPr lang="pt-BR" dirty="0">
+                <a:solidFill>
+                  <a:schemeClr val="tx1"/>
+                </a:solidFill>
+              </a:rPr>
+              <a:t>pagina inicio: http://localhost:4200/antonio/</a:t>
+            </a:r>
+          </a:p>
+        </p:txBody>
+      </p:sp>
+      <p:pic>
+        <p:nvPicPr>
+          <p:cNvPr id="6" name="Imagem 5"/>
+          <p:cNvPicPr>
+            <a:picLocks noChangeAspect="1"/>
+          </p:cNvPicPr>
+          <p:nvPr/>
+        </p:nvPicPr>
+        <p:blipFill>
+          <a:blip r:embed="rId4"/>
+          <a:stretch>
+            <a:fillRect/>
+          </a:stretch>
+        </p:blipFill>
+        <p:spPr>
+          <a:xfrm>
+            <a:off x="4087498" y="152616"/>
+            <a:ext cx="7667625" cy="904875"/>
+          </a:xfrm>
+          <a:prstGeom prst="rect">
+            <a:avLst/>
+          </a:prstGeom>
+        </p:spPr>
+      </p:pic>
+    </p:spTree>
+    <p:extLst>
+      <p:ext uri="{BB962C8B-B14F-4D97-AF65-F5344CB8AC3E}">
+        <p14:creationId xmlns:p14="http://schemas.microsoft.com/office/powerpoint/2010/main" val="18270446"/>
+      </p:ext>
+    </p:extLst>
+  </p:cSld>
+  <p:clrMapOvr>
+    <a:masterClrMapping/>
+  </p:clrMapOvr>
+</p:sld>
+</file>
+
+<file path=ppt/slides/slide9.xml><?xml version="1.0" encoding="utf-8"?>
+<p:sld xmlns:a="http://schemas.openxmlformats.org/drawingml/2006/main" xmlns:r="http://schemas.openxmlformats.org/officeDocument/2006/relationships" xmlns:p="http://schemas.openxmlformats.org/presentationml/2006/main">
+  <p:cSld>
+    <p:spTree>
+      <p:nvGrpSpPr>
+        <p:cNvPr id="1" name=""/>
+        <p:cNvGrpSpPr/>
+        <p:nvPr/>
+      </p:nvGrpSpPr>
+      <p:grpSpPr>
+        <a:xfrm>
+          <a:off x="0" y="0"/>
+          <a:ext cx="0" cy="0"/>
+          <a:chOff x="0" y="0"/>
+          <a:chExt cx="0" cy="0"/>
+        </a:xfrm>
+      </p:grpSpPr>
+      <p:sp>
+        <p:nvSpPr>
+          <p:cNvPr id="2" name="Título 1"/>
+          <p:cNvSpPr>
+            <a:spLocks noGrp="1"/>
+          </p:cNvSpPr>
+          <p:nvPr>
+            <p:ph type="title"/>
+          </p:nvPr>
+        </p:nvSpPr>
+        <p:spPr/>
+        <p:txBody>
+          <a:bodyPr/>
+          <a:lstStyle/>
+          <a:p>
+            <a:r>
+              <a:rPr lang="pt-BR" dirty="0" smtClean="0"/>
+              <a:t>Fluxo Rotas</a:t>
+            </a:r>
+            <a:endParaRPr lang="pt-BR" dirty="0"/>
+          </a:p>
+        </p:txBody>
+      </p:sp>
+      <p:sp>
+        <p:nvSpPr>
+          <p:cNvPr id="3" name="Retângulo 2"/>
+          <p:cNvSpPr/>
+          <p:nvPr/>
+        </p:nvSpPr>
+        <p:spPr>
+          <a:xfrm>
+            <a:off x="838200" y="2099256"/>
+            <a:ext cx="1801969" cy="824248"/>
+          </a:xfrm>
+          <a:prstGeom prst="rect">
+            <a:avLst/>
+          </a:prstGeom>
+          <a:noFill/>
+        </p:spPr>
+        <p:style>
+          <a:lnRef idx="2">
+            <a:schemeClr val="accent1">
+              <a:shade val="50000"/>
+            </a:schemeClr>
+          </a:lnRef>
+          <a:fillRef idx="1">
+            <a:schemeClr val="accent1"/>
+          </a:fillRef>
+          <a:effectRef idx="0">
+            <a:schemeClr val="accent1"/>
+          </a:effectRef>
+          <a:fontRef idx="minor">
+            <a:schemeClr val="lt1"/>
+          </a:fontRef>
+        </p:style>
+        <p:txBody>
+          <a:bodyPr rtlCol="0" anchor="ctr"/>
+          <a:lstStyle/>
+          <a:p>
+            <a:pPr algn="ctr"/>
+            <a:r>
+              <a:rPr lang="pt-BR" dirty="0" smtClean="0">
+                <a:solidFill>
+                  <a:schemeClr val="tx1"/>
+                </a:solidFill>
+              </a:rPr>
+              <a:t>Componente de Rotas</a:t>
+            </a:r>
+            <a:endParaRPr lang="pt-BR" dirty="0">
+              <a:solidFill>
+                <a:schemeClr val="tx1"/>
+              </a:solidFill>
+            </a:endParaRPr>
+          </a:p>
+        </p:txBody>
+      </p:sp>
+      <p:cxnSp>
+        <p:nvCxnSpPr>
+          <p:cNvPr id="5" name="Conector de seta reta 4"/>
+          <p:cNvCxnSpPr>
+            <a:stCxn id="3" idx="3"/>
+          </p:cNvCxnSpPr>
+          <p:nvPr/>
+        </p:nvCxnSpPr>
+        <p:spPr>
+          <a:xfrm>
+            <a:off x="2640169" y="2511380"/>
+            <a:ext cx="875763" cy="0"/>
+          </a:xfrm>
+          <a:prstGeom prst="straightConnector1">
+            <a:avLst/>
+          </a:prstGeom>
+          <a:ln>
+            <a:tailEnd type="triangle"/>
+          </a:ln>
+        </p:spPr>
+        <p:style>
+          <a:lnRef idx="1">
+            <a:schemeClr val="accent1"/>
+          </a:lnRef>
+          <a:fillRef idx="0">
+            <a:schemeClr val="accent1"/>
+          </a:fillRef>
+          <a:effectRef idx="0">
+            <a:schemeClr val="accent1"/>
+          </a:effectRef>
+          <a:fontRef idx="minor">
+            <a:schemeClr val="tx1"/>
+          </a:fontRef>
+        </p:style>
+      </p:cxnSp>
+      <p:sp>
+        <p:nvSpPr>
+          <p:cNvPr id="7" name="Retângulo 6"/>
+          <p:cNvSpPr/>
+          <p:nvPr/>
+        </p:nvSpPr>
+        <p:spPr>
+          <a:xfrm>
+            <a:off x="3541153" y="2099256"/>
+            <a:ext cx="1801969" cy="824248"/>
+          </a:xfrm>
+          <a:prstGeom prst="rect">
+            <a:avLst/>
+          </a:prstGeom>
+          <a:noFill/>
+        </p:spPr>
+        <p:style>
+          <a:lnRef idx="2">
+            <a:schemeClr val="accent1">
+              <a:shade val="50000"/>
+            </a:schemeClr>
+          </a:lnRef>
+          <a:fillRef idx="1">
+            <a:schemeClr val="accent1"/>
+          </a:fillRef>
+          <a:effectRef idx="0">
+            <a:schemeClr val="accent1"/>
+          </a:effectRef>
+          <a:fontRef idx="minor">
+            <a:schemeClr val="lt1"/>
+          </a:fontRef>
+        </p:style>
+        <p:txBody>
+          <a:bodyPr rtlCol="0" anchor="ctr"/>
+          <a:lstStyle/>
+          <a:p>
+            <a:pPr algn="ctr"/>
+            <a:r>
+              <a:rPr lang="pt-BR" dirty="0" smtClean="0">
+                <a:solidFill>
+                  <a:schemeClr val="tx1"/>
+                </a:solidFill>
+              </a:rPr>
+              <a:t>Declaração como Rota em </a:t>
+            </a:r>
+            <a:r>
+              <a:rPr lang="pt-BR" dirty="0" err="1" smtClean="0">
+                <a:solidFill>
+                  <a:schemeClr val="tx1"/>
+                </a:solidFill>
+              </a:rPr>
+              <a:t>AppModel</a:t>
+            </a:r>
+            <a:endParaRPr lang="pt-BR" dirty="0">
+              <a:solidFill>
+                <a:schemeClr val="tx1"/>
+              </a:solidFill>
+            </a:endParaRPr>
+          </a:p>
+        </p:txBody>
+      </p:sp>
+      <p:sp>
+        <p:nvSpPr>
+          <p:cNvPr id="8" name="Retângulo 7"/>
+          <p:cNvSpPr/>
+          <p:nvPr/>
+        </p:nvSpPr>
+        <p:spPr>
+          <a:xfrm>
+            <a:off x="6244106" y="2099255"/>
+            <a:ext cx="1801969" cy="1159099"/>
+          </a:xfrm>
+          <a:prstGeom prst="rect">
+            <a:avLst/>
+          </a:prstGeom>
+          <a:noFill/>
+        </p:spPr>
+        <p:style>
+          <a:lnRef idx="2">
+            <a:schemeClr val="accent1">
+              <a:shade val="50000"/>
+            </a:schemeClr>
+          </a:lnRef>
+          <a:fillRef idx="1">
+            <a:schemeClr val="accent1"/>
+          </a:fillRef>
+          <a:effectRef idx="0">
+            <a:schemeClr val="accent1"/>
+          </a:effectRef>
+          <a:fontRef idx="minor">
+            <a:schemeClr val="lt1"/>
+          </a:fontRef>
+        </p:style>
+        <p:txBody>
+          <a:bodyPr rtlCol="0" anchor="ctr"/>
+          <a:lstStyle/>
+          <a:p>
+            <a:pPr algn="ctr"/>
+            <a:r>
+              <a:rPr lang="pt-BR" dirty="0" smtClean="0">
+                <a:solidFill>
+                  <a:schemeClr val="tx1"/>
+                </a:solidFill>
+              </a:rPr>
+              <a:t>Se Principal configura o </a:t>
+            </a:r>
+            <a:r>
+              <a:rPr lang="pt-BR" dirty="0" err="1" smtClean="0">
+                <a:solidFill>
+                  <a:schemeClr val="tx1"/>
+                </a:solidFill>
+              </a:rPr>
+              <a:t>forRoot</a:t>
+            </a:r>
+            <a:r>
+              <a:rPr lang="pt-BR" dirty="0" smtClean="0">
+                <a:solidFill>
+                  <a:schemeClr val="tx1"/>
+                </a:solidFill>
+              </a:rPr>
+              <a:t> e o </a:t>
+            </a:r>
+            <a:r>
+              <a:rPr lang="pt-BR" dirty="0" err="1" smtClean="0">
+                <a:solidFill>
+                  <a:schemeClr val="tx1"/>
+                </a:solidFill>
+              </a:rPr>
+              <a:t>Base_Href</a:t>
+            </a:r>
+            <a:endParaRPr lang="pt-BR" dirty="0">
+              <a:solidFill>
+                <a:schemeClr val="tx1"/>
+              </a:solidFill>
+            </a:endParaRPr>
+          </a:p>
+        </p:txBody>
+      </p:sp>
+      <p:cxnSp>
+        <p:nvCxnSpPr>
+          <p:cNvPr id="9" name="Conector de seta reta 8"/>
+          <p:cNvCxnSpPr/>
+          <p:nvPr/>
+        </p:nvCxnSpPr>
+        <p:spPr>
+          <a:xfrm>
+            <a:off x="5343122" y="2511380"/>
+            <a:ext cx="875763" cy="0"/>
+          </a:xfrm>
+          <a:prstGeom prst="straightConnector1">
+            <a:avLst/>
+          </a:prstGeom>
+          <a:ln>
+            <a:tailEnd type="triangle"/>
+          </a:ln>
+        </p:spPr>
+        <p:style>
+          <a:lnRef idx="1">
+            <a:schemeClr val="accent1"/>
+          </a:lnRef>
+          <a:fillRef idx="0">
+            <a:schemeClr val="accent1"/>
+          </a:fillRef>
+          <a:effectRef idx="0">
+            <a:schemeClr val="accent1"/>
+          </a:effectRef>
+          <a:fontRef idx="minor">
+            <a:schemeClr val="tx1"/>
+          </a:fontRef>
+        </p:style>
+      </p:cxnSp>
+    </p:spTree>
+    <p:extLst>
+      <p:ext uri="{BB962C8B-B14F-4D97-AF65-F5344CB8AC3E}">
+        <p14:creationId xmlns:p14="http://schemas.microsoft.com/office/powerpoint/2010/main" val="2832323455"/>
+      </p:ext>
+    </p:extLst>
+  </p:cSld>
+  <p:clrMapOvr>
+    <a:masterClrMapping/>
+  </p:clrMapOvr>
+</p:sld>
+</file>
+
 <file path=ppt/theme/theme1.xml><?xml version="1.0" encoding="utf-8"?>
 <a:theme xmlns:a="http://schemas.openxmlformats.org/drawingml/2006/main" name="Tema do Office">
   <a:themeElements>

</xml_diff>

<commit_message>
Data Binding e Component de calculos
</commit_message>
<xml_diff>
--- a/Mapas.pptx
+++ b/Mapas.pptx
@@ -14,6 +14,8 @@
     <p:sldId id="262" r:id="rId8"/>
     <p:sldId id="263" r:id="rId9"/>
     <p:sldId id="264" r:id="rId10"/>
+    <p:sldId id="265" r:id="rId11"/>
+    <p:sldId id="266" r:id="rId12"/>
   </p:sldIdLst>
   <p:sldSz cx="12192000" cy="6858000"/>
   <p:notesSz cx="6858000" cy="9144000"/>
@@ -251,7 +253,7 @@
           <a:p>
             <a:fld id="{6CC97BCC-8571-45FC-B7FA-65F35AFF22BA}" type="datetimeFigureOut">
               <a:rPr lang="pt-BR" smtClean="0"/>
-              <a:t>03/10/2022</a:t>
+              <a:t>04/10/2022</a:t>
             </a:fld>
             <a:endParaRPr lang="pt-BR"/>
           </a:p>
@@ -421,7 +423,7 @@
           <a:p>
             <a:fld id="{6CC97BCC-8571-45FC-B7FA-65F35AFF22BA}" type="datetimeFigureOut">
               <a:rPr lang="pt-BR" smtClean="0"/>
-              <a:t>03/10/2022</a:t>
+              <a:t>04/10/2022</a:t>
             </a:fld>
             <a:endParaRPr lang="pt-BR"/>
           </a:p>
@@ -601,7 +603,7 @@
           <a:p>
             <a:fld id="{6CC97BCC-8571-45FC-B7FA-65F35AFF22BA}" type="datetimeFigureOut">
               <a:rPr lang="pt-BR" smtClean="0"/>
-              <a:t>03/10/2022</a:t>
+              <a:t>04/10/2022</a:t>
             </a:fld>
             <a:endParaRPr lang="pt-BR"/>
           </a:p>
@@ -771,7 +773,7 @@
           <a:p>
             <a:fld id="{6CC97BCC-8571-45FC-B7FA-65F35AFF22BA}" type="datetimeFigureOut">
               <a:rPr lang="pt-BR" smtClean="0"/>
-              <a:t>03/10/2022</a:t>
+              <a:t>04/10/2022</a:t>
             </a:fld>
             <a:endParaRPr lang="pt-BR"/>
           </a:p>
@@ -1017,7 +1019,7 @@
           <a:p>
             <a:fld id="{6CC97BCC-8571-45FC-B7FA-65F35AFF22BA}" type="datetimeFigureOut">
               <a:rPr lang="pt-BR" smtClean="0"/>
-              <a:t>03/10/2022</a:t>
+              <a:t>04/10/2022</a:t>
             </a:fld>
             <a:endParaRPr lang="pt-BR"/>
           </a:p>
@@ -1249,7 +1251,7 @@
           <a:p>
             <a:fld id="{6CC97BCC-8571-45FC-B7FA-65F35AFF22BA}" type="datetimeFigureOut">
               <a:rPr lang="pt-BR" smtClean="0"/>
-              <a:t>03/10/2022</a:t>
+              <a:t>04/10/2022</a:t>
             </a:fld>
             <a:endParaRPr lang="pt-BR"/>
           </a:p>
@@ -1616,7 +1618,7 @@
           <a:p>
             <a:fld id="{6CC97BCC-8571-45FC-B7FA-65F35AFF22BA}" type="datetimeFigureOut">
               <a:rPr lang="pt-BR" smtClean="0"/>
-              <a:t>03/10/2022</a:t>
+              <a:t>04/10/2022</a:t>
             </a:fld>
             <a:endParaRPr lang="pt-BR"/>
           </a:p>
@@ -1734,7 +1736,7 @@
           <a:p>
             <a:fld id="{6CC97BCC-8571-45FC-B7FA-65F35AFF22BA}" type="datetimeFigureOut">
               <a:rPr lang="pt-BR" smtClean="0"/>
-              <a:t>03/10/2022</a:t>
+              <a:t>04/10/2022</a:t>
             </a:fld>
             <a:endParaRPr lang="pt-BR"/>
           </a:p>
@@ -1829,7 +1831,7 @@
           <a:p>
             <a:fld id="{6CC97BCC-8571-45FC-B7FA-65F35AFF22BA}" type="datetimeFigureOut">
               <a:rPr lang="pt-BR" smtClean="0"/>
-              <a:t>03/10/2022</a:t>
+              <a:t>04/10/2022</a:t>
             </a:fld>
             <a:endParaRPr lang="pt-BR"/>
           </a:p>
@@ -2106,7 +2108,7 @@
           <a:p>
             <a:fld id="{6CC97BCC-8571-45FC-B7FA-65F35AFF22BA}" type="datetimeFigureOut">
               <a:rPr lang="pt-BR" smtClean="0"/>
-              <a:t>03/10/2022</a:t>
+              <a:t>04/10/2022</a:t>
             </a:fld>
             <a:endParaRPr lang="pt-BR"/>
           </a:p>
@@ -2359,7 +2361,7 @@
           <a:p>
             <a:fld id="{6CC97BCC-8571-45FC-B7FA-65F35AFF22BA}" type="datetimeFigureOut">
               <a:rPr lang="pt-BR" smtClean="0"/>
-              <a:t>03/10/2022</a:t>
+              <a:t>04/10/2022</a:t>
             </a:fld>
             <a:endParaRPr lang="pt-BR"/>
           </a:p>
@@ -2572,7 +2574,7 @@
           <a:p>
             <a:fld id="{6CC97BCC-8571-45FC-B7FA-65F35AFF22BA}" type="datetimeFigureOut">
               <a:rPr lang="pt-BR" smtClean="0"/>
-              <a:t>03/10/2022</a:t>
+              <a:t>04/10/2022</a:t>
             </a:fld>
             <a:endParaRPr lang="pt-BR"/>
           </a:p>
@@ -3672,6 +3674,404 @@
 </p:sld>
 </file>
 
+<file path=ppt/slides/slide10.xml><?xml version="1.0" encoding="utf-8"?>
+<p:sld xmlns:a="http://schemas.openxmlformats.org/drawingml/2006/main" xmlns:r="http://schemas.openxmlformats.org/officeDocument/2006/relationships" xmlns:p="http://schemas.openxmlformats.org/presentationml/2006/main">
+  <p:cSld>
+    <p:spTree>
+      <p:nvGrpSpPr>
+        <p:cNvPr id="1" name=""/>
+        <p:cNvGrpSpPr/>
+        <p:nvPr/>
+      </p:nvGrpSpPr>
+      <p:grpSpPr>
+        <a:xfrm>
+          <a:off x="0" y="0"/>
+          <a:ext cx="0" cy="0"/>
+          <a:chOff x="0" y="0"/>
+          <a:chExt cx="0" cy="0"/>
+        </a:xfrm>
+      </p:grpSpPr>
+      <p:sp>
+        <p:nvSpPr>
+          <p:cNvPr id="2" name="Título 1"/>
+          <p:cNvSpPr>
+            <a:spLocks noGrp="1"/>
+          </p:cNvSpPr>
+          <p:nvPr>
+            <p:ph type="title"/>
+          </p:nvPr>
+        </p:nvSpPr>
+        <p:spPr/>
+        <p:txBody>
+          <a:bodyPr/>
+          <a:lstStyle/>
+          <a:p>
+            <a:r>
+              <a:rPr lang="pt-BR" dirty="0" smtClean="0"/>
+              <a:t>Data </a:t>
+            </a:r>
+            <a:r>
+              <a:rPr lang="pt-BR" dirty="0" err="1" smtClean="0"/>
+              <a:t>Binding</a:t>
+            </a:r>
+            <a:endParaRPr lang="pt-BR" dirty="0"/>
+          </a:p>
+        </p:txBody>
+      </p:sp>
+      <p:sp>
+        <p:nvSpPr>
+          <p:cNvPr id="3" name="Retângulo 2"/>
+          <p:cNvSpPr/>
+          <p:nvPr/>
+        </p:nvSpPr>
+        <p:spPr>
+          <a:xfrm>
+            <a:off x="838200" y="2047741"/>
+            <a:ext cx="2471670" cy="1171977"/>
+          </a:xfrm>
+          <a:prstGeom prst="rect">
+            <a:avLst/>
+          </a:prstGeom>
+          <a:noFill/>
+        </p:spPr>
+        <p:style>
+          <a:lnRef idx="2">
+            <a:schemeClr val="accent1">
+              <a:shade val="50000"/>
+            </a:schemeClr>
+          </a:lnRef>
+          <a:fillRef idx="1">
+            <a:schemeClr val="accent1"/>
+          </a:fillRef>
+          <a:effectRef idx="0">
+            <a:schemeClr val="accent1"/>
+          </a:effectRef>
+          <a:fontRef idx="minor">
+            <a:schemeClr val="lt1"/>
+          </a:fontRef>
+        </p:style>
+        <p:txBody>
+          <a:bodyPr rtlCol="0" anchor="ctr"/>
+          <a:lstStyle/>
+          <a:p>
+            <a:pPr algn="ctr"/>
+            <a:r>
+              <a:rPr lang="pt-BR" dirty="0" err="1" smtClean="0">
+                <a:solidFill>
+                  <a:schemeClr val="tx1"/>
+                </a:solidFill>
+              </a:rPr>
+              <a:t>Interpolation</a:t>
+            </a:r>
+            <a:r>
+              <a:rPr lang="pt-BR" dirty="0" smtClean="0">
+                <a:solidFill>
+                  <a:schemeClr val="tx1"/>
+                </a:solidFill>
+              </a:rPr>
+              <a:t>: a forma mais fácil de exibir conteúdo do </a:t>
+            </a:r>
+            <a:r>
+              <a:rPr lang="pt-BR" dirty="0" err="1" smtClean="0">
+                <a:solidFill>
+                  <a:schemeClr val="tx1"/>
+                </a:solidFill>
+              </a:rPr>
+              <a:t>ts</a:t>
+            </a:r>
+            <a:r>
+              <a:rPr lang="pt-BR" dirty="0" smtClean="0">
+                <a:solidFill>
+                  <a:schemeClr val="tx1"/>
+                </a:solidFill>
+              </a:rPr>
+              <a:t> para o </a:t>
+            </a:r>
+            <a:r>
+              <a:rPr lang="pt-BR" dirty="0" err="1" smtClean="0">
+                <a:solidFill>
+                  <a:schemeClr val="tx1"/>
+                </a:solidFill>
+              </a:rPr>
+              <a:t>html</a:t>
+            </a:r>
+            <a:endParaRPr lang="pt-BR" dirty="0">
+              <a:solidFill>
+                <a:schemeClr val="tx1"/>
+              </a:solidFill>
+            </a:endParaRPr>
+          </a:p>
+        </p:txBody>
+      </p:sp>
+      <p:pic>
+        <p:nvPicPr>
+          <p:cNvPr id="4" name="Imagem 3"/>
+          <p:cNvPicPr>
+            <a:picLocks noChangeAspect="1"/>
+          </p:cNvPicPr>
+          <p:nvPr/>
+        </p:nvPicPr>
+        <p:blipFill>
+          <a:blip r:embed="rId2"/>
+          <a:stretch>
+            <a:fillRect/>
+          </a:stretch>
+        </p:blipFill>
+        <p:spPr>
+          <a:xfrm>
+            <a:off x="495434" y="3576771"/>
+            <a:ext cx="3448050" cy="504825"/>
+          </a:xfrm>
+          <a:prstGeom prst="rect">
+            <a:avLst/>
+          </a:prstGeom>
+        </p:spPr>
+      </p:pic>
+      <p:pic>
+        <p:nvPicPr>
+          <p:cNvPr id="5" name="Imagem 4"/>
+          <p:cNvPicPr>
+            <a:picLocks noChangeAspect="1"/>
+          </p:cNvPicPr>
+          <p:nvPr/>
+        </p:nvPicPr>
+        <p:blipFill>
+          <a:blip r:embed="rId3"/>
+          <a:stretch>
+            <a:fillRect/>
+          </a:stretch>
+        </p:blipFill>
+        <p:spPr>
+          <a:xfrm>
+            <a:off x="1316797" y="4229099"/>
+            <a:ext cx="1514475" cy="419100"/>
+          </a:xfrm>
+          <a:prstGeom prst="rect">
+            <a:avLst/>
+          </a:prstGeom>
+        </p:spPr>
+      </p:pic>
+      <p:sp>
+        <p:nvSpPr>
+          <p:cNvPr id="6" name="Retângulo 5"/>
+          <p:cNvSpPr/>
+          <p:nvPr/>
+        </p:nvSpPr>
+        <p:spPr>
+          <a:xfrm>
+            <a:off x="4860165" y="2047740"/>
+            <a:ext cx="2471670" cy="1403798"/>
+          </a:xfrm>
+          <a:prstGeom prst="rect">
+            <a:avLst/>
+          </a:prstGeom>
+          <a:noFill/>
+        </p:spPr>
+        <p:style>
+          <a:lnRef idx="2">
+            <a:schemeClr val="accent1">
+              <a:shade val="50000"/>
+            </a:schemeClr>
+          </a:lnRef>
+          <a:fillRef idx="1">
+            <a:schemeClr val="accent1"/>
+          </a:fillRef>
+          <a:effectRef idx="0">
+            <a:schemeClr val="accent1"/>
+          </a:effectRef>
+          <a:fontRef idx="minor">
+            <a:schemeClr val="lt1"/>
+          </a:fontRef>
+        </p:style>
+        <p:txBody>
+          <a:bodyPr rtlCol="0" anchor="ctr"/>
+          <a:lstStyle/>
+          <a:p>
+            <a:pPr algn="ctr"/>
+            <a:r>
+              <a:rPr lang="pt-BR" dirty="0" err="1" smtClean="0">
+                <a:solidFill>
+                  <a:schemeClr val="tx1"/>
+                </a:solidFill>
+              </a:rPr>
+              <a:t>PropertyBinding</a:t>
+            </a:r>
+            <a:r>
+              <a:rPr lang="pt-BR" dirty="0" smtClean="0">
+                <a:solidFill>
+                  <a:schemeClr val="tx1"/>
+                </a:solidFill>
+              </a:rPr>
+              <a:t>: Define um valor de uma propriedade do HTML</a:t>
+            </a:r>
+            <a:br>
+              <a:rPr lang="pt-BR" dirty="0" smtClean="0">
+                <a:solidFill>
+                  <a:schemeClr val="tx1"/>
+                </a:solidFill>
+              </a:rPr>
+            </a:br>
+            <a:r>
+              <a:rPr lang="pt-BR" dirty="0" smtClean="0">
+                <a:solidFill>
+                  <a:schemeClr val="tx1"/>
+                </a:solidFill>
+              </a:rPr>
+              <a:t>“o dado recebido vem do angular”</a:t>
+            </a:r>
+            <a:endParaRPr lang="pt-BR" dirty="0">
+              <a:solidFill>
+                <a:schemeClr val="tx1"/>
+              </a:solidFill>
+            </a:endParaRPr>
+          </a:p>
+        </p:txBody>
+      </p:sp>
+      <p:sp>
+        <p:nvSpPr>
+          <p:cNvPr id="7" name="Retângulo 6"/>
+          <p:cNvSpPr/>
+          <p:nvPr/>
+        </p:nvSpPr>
+        <p:spPr>
+          <a:xfrm>
+            <a:off x="8882130" y="2047739"/>
+            <a:ext cx="2471670" cy="1171977"/>
+          </a:xfrm>
+          <a:prstGeom prst="rect">
+            <a:avLst/>
+          </a:prstGeom>
+          <a:noFill/>
+        </p:spPr>
+        <p:style>
+          <a:lnRef idx="2">
+            <a:schemeClr val="accent1">
+              <a:shade val="50000"/>
+            </a:schemeClr>
+          </a:lnRef>
+          <a:fillRef idx="1">
+            <a:schemeClr val="accent1"/>
+          </a:fillRef>
+          <a:effectRef idx="0">
+            <a:schemeClr val="accent1"/>
+          </a:effectRef>
+          <a:fontRef idx="minor">
+            <a:schemeClr val="lt1"/>
+          </a:fontRef>
+        </p:style>
+        <p:txBody>
+          <a:bodyPr rtlCol="0" anchor="ctr"/>
+          <a:lstStyle/>
+          <a:p>
+            <a:pPr algn="ctr"/>
+            <a:r>
+              <a:rPr lang="pt-BR" dirty="0" err="1" smtClean="0">
+                <a:solidFill>
+                  <a:schemeClr val="tx1"/>
+                </a:solidFill>
+              </a:rPr>
+              <a:t>EventBinding</a:t>
+            </a:r>
+            <a:endParaRPr lang="pt-BR" dirty="0">
+              <a:solidFill>
+                <a:schemeClr val="tx1"/>
+              </a:solidFill>
+            </a:endParaRPr>
+          </a:p>
+        </p:txBody>
+      </p:sp>
+    </p:spTree>
+    <p:extLst>
+      <p:ext uri="{BB962C8B-B14F-4D97-AF65-F5344CB8AC3E}">
+        <p14:creationId xmlns:p14="http://schemas.microsoft.com/office/powerpoint/2010/main" val="2237776311"/>
+      </p:ext>
+    </p:extLst>
+  </p:cSld>
+  <p:clrMapOvr>
+    <a:masterClrMapping/>
+  </p:clrMapOvr>
+</p:sld>
+</file>
+
+<file path=ppt/slides/slide11.xml><?xml version="1.0" encoding="utf-8"?>
+<p:sld xmlns:a="http://schemas.openxmlformats.org/drawingml/2006/main" xmlns:r="http://schemas.openxmlformats.org/officeDocument/2006/relationships" xmlns:p="http://schemas.openxmlformats.org/presentationml/2006/main">
+  <p:cSld>
+    <p:spTree>
+      <p:nvGrpSpPr>
+        <p:cNvPr id="1" name=""/>
+        <p:cNvGrpSpPr/>
+        <p:nvPr/>
+      </p:nvGrpSpPr>
+      <p:grpSpPr>
+        <a:xfrm>
+          <a:off x="0" y="0"/>
+          <a:ext cx="0" cy="0"/>
+          <a:chOff x="0" y="0"/>
+          <a:chExt cx="0" cy="0"/>
+        </a:xfrm>
+      </p:grpSpPr>
+      <p:sp>
+        <p:nvSpPr>
+          <p:cNvPr id="2" name="Título 1"/>
+          <p:cNvSpPr>
+            <a:spLocks noGrp="1"/>
+          </p:cNvSpPr>
+          <p:nvPr>
+            <p:ph type="title"/>
+          </p:nvPr>
+        </p:nvSpPr>
+        <p:spPr/>
+        <p:txBody>
+          <a:bodyPr/>
+          <a:lstStyle/>
+          <a:p>
+            <a:endParaRPr lang="pt-BR"/>
+          </a:p>
+        </p:txBody>
+      </p:sp>
+      <p:pic>
+        <p:nvPicPr>
+          <p:cNvPr id="3" name="Imagem 2"/>
+          <p:cNvPicPr>
+            <a:picLocks noChangeAspect="1"/>
+          </p:cNvPicPr>
+          <p:nvPr/>
+        </p:nvPicPr>
+        <p:blipFill>
+          <a:blip r:embed="rId2">
+            <a:extLst>
+              <a:ext uri="{28A0092B-C50C-407E-A947-70E740481C1C}">
+                <a14:useLocalDpi xmlns:a14="http://schemas.microsoft.com/office/drawing/2010/main" val="0"/>
+              </a:ext>
+            </a:extLst>
+          </a:blip>
+          <a:stretch>
+            <a:fillRect/>
+          </a:stretch>
+        </p:blipFill>
+        <p:spPr>
+          <a:xfrm>
+            <a:off x="3282498" y="1844077"/>
+            <a:ext cx="5256195" cy="4897818"/>
+          </a:xfrm>
+          <a:prstGeom prst="rect">
+            <a:avLst/>
+          </a:prstGeom>
+        </p:spPr>
+      </p:pic>
+    </p:spTree>
+    <p:extLst>
+      <p:ext uri="{BB962C8B-B14F-4D97-AF65-F5344CB8AC3E}">
+        <p14:creationId xmlns:p14="http://schemas.microsoft.com/office/powerpoint/2010/main" val="1782344781"/>
+      </p:ext>
+    </p:extLst>
+  </p:cSld>
+  <p:clrMapOvr>
+    <a:masterClrMapping/>
+  </p:clrMapOvr>
+</p:sld>
+</file>
+
 <file path=ppt/slides/slide2.xml><?xml version="1.0" encoding="utf-8"?>
 <p:sld xmlns:a="http://schemas.openxmlformats.org/drawingml/2006/main" xmlns:r="http://schemas.openxmlformats.org/officeDocument/2006/relationships" xmlns:p="http://schemas.openxmlformats.org/presentationml/2006/main">
   <p:cSld>

</xml_diff>